<commit_message>
added top wine files
</commit_message>
<xml_diff>
--- a/Output/pourtaste.pptx
+++ b/Output/pourtaste.pptx
@@ -242,7 +242,7 @@
           <a:p>
             <a:fld id="{CDA3C146-E2BA-41EA-8AE9-0C67692768F2}" type="datetimeFigureOut">
               <a:rPr lang="ru-RU" smtClean="0"/>
-              <a:t>27.10.2018</a:t>
+              <a:t>29.10.2018</a:t>
             </a:fld>
             <a:endParaRPr lang="ru-RU" dirty="0"/>
           </a:p>
@@ -419,7 +419,7 @@
           <a:p>
             <a:fld id="{1F7D3EB6-8099-4744-9273-C8C1DD61A2EA}" type="datetimeFigureOut">
               <a:rPr lang="ru-RU" smtClean="0"/>
-              <a:t>27.10.2018</a:t>
+              <a:t>29.10.2018</a:t>
             </a:fld>
             <a:endParaRPr lang="ru-RU" dirty="0"/>
           </a:p>
@@ -44157,14 +44157,19 @@
             <p:ph type="title"/>
           </p:nvPr>
         </p:nvSpPr>
-        <p:spPr/>
+        <p:spPr>
+          <a:xfrm>
+            <a:off x="899666" y="353995"/>
+            <a:ext cx="10515600" cy="652969"/>
+          </a:xfrm>
+        </p:spPr>
         <p:txBody>
           <a:bodyPr/>
           <a:lstStyle/>
           <a:p>
             <a:r>
               <a:rPr lang="en-US" dirty="0"/>
-              <a:t>Top 5 Wines under $20</a:t>
+              <a:t>Top Cheap Wines ($20 or under)</a:t>
             </a:r>
           </a:p>
         </p:txBody>
@@ -44192,36 +44197,7 @@
           <a:p>
             <a:r>
               <a:rPr lang="en-US" dirty="0"/>
-              <a:t>MM.DD.20XX</a:t>
-            </a:r>
-            <a:endParaRPr lang="ru-RU" dirty="0"/>
-          </a:p>
-        </p:txBody>
-      </p:sp>
-      <p:sp>
-        <p:nvSpPr>
-          <p:cNvPr id="4" name="Footer Placeholder 3">
-            <a:extLst>
-              <a:ext uri="{FF2B5EF4-FFF2-40B4-BE49-F238E27FC236}">
-                <a16:creationId xmlns:a16="http://schemas.microsoft.com/office/drawing/2014/main" id="{E1BF5346-7BD4-44CE-9487-D284ED90E960}"/>
-              </a:ext>
-            </a:extLst>
-          </p:cNvPr>
-          <p:cNvSpPr>
-            <a:spLocks noGrp="1"/>
-          </p:cNvSpPr>
-          <p:nvPr>
-            <p:ph type="ftr" sz="quarter" idx="11"/>
-          </p:nvPr>
-        </p:nvSpPr>
-        <p:spPr/>
-        <p:txBody>
-          <a:bodyPr/>
-          <a:lstStyle/>
-          <a:p>
-            <a:r>
-              <a:rPr lang="en-US" dirty="0"/>
-              <a:t>ADD A FOOTER</a:t>
+              <a:t>11.10.2018</a:t>
             </a:r>
             <a:endParaRPr lang="ru-RU" dirty="0"/>
           </a:p>
@@ -44257,31 +44233,93 @@
           </a:p>
         </p:txBody>
       </p:sp>
-      <p:sp>
-        <p:nvSpPr>
-          <p:cNvPr id="18" name="Content Placeholder 17">
-            <a:extLst>
-              <a:ext uri="{FF2B5EF4-FFF2-40B4-BE49-F238E27FC236}">
-                <a16:creationId xmlns:a16="http://schemas.microsoft.com/office/drawing/2014/main" id="{7AD4EFBE-FBAC-4B70-9CE9-BCDA648E19F8}"/>
-              </a:ext>
-            </a:extLst>
-          </p:cNvPr>
-          <p:cNvSpPr>
-            <a:spLocks noGrp="1"/>
-          </p:cNvSpPr>
-          <p:nvPr>
-            <p:ph idx="1"/>
-          </p:nvPr>
-        </p:nvSpPr>
-        <p:spPr/>
-        <p:txBody>
-          <a:bodyPr/>
+      <p:pic>
+        <p:nvPicPr>
+          <p:cNvPr id="11" name="Picture 10">
+            <a:extLst>
+              <a:ext uri="{FF2B5EF4-FFF2-40B4-BE49-F238E27FC236}">
+                <a16:creationId xmlns:a16="http://schemas.microsoft.com/office/drawing/2014/main" id="{0B962F66-3AFC-4F89-8497-33E55B7F93F7}"/>
+              </a:ext>
+            </a:extLst>
+          </p:cNvPr>
+          <p:cNvPicPr>
+            <a:picLocks noChangeAspect="1"/>
+          </p:cNvPicPr>
+          <p:nvPr/>
+        </p:nvPicPr>
+        <p:blipFill>
+          <a:blip r:embed="rId2"/>
+          <a:stretch>
+            <a:fillRect/>
+          </a:stretch>
+        </p:blipFill>
+        <p:spPr>
+          <a:xfrm>
+            <a:off x="955888" y="1091762"/>
+            <a:ext cx="7414083" cy="4786958"/>
+          </a:xfrm>
+          <a:prstGeom prst="rect">
+            <a:avLst/>
+          </a:prstGeom>
+        </p:spPr>
+      </p:pic>
+      <p:sp>
+        <p:nvSpPr>
+          <p:cNvPr id="12" name="TextBox 11">
+            <a:extLst>
+              <a:ext uri="{FF2B5EF4-FFF2-40B4-BE49-F238E27FC236}">
+                <a16:creationId xmlns:a16="http://schemas.microsoft.com/office/drawing/2014/main" id="{F02E6442-E63C-444D-B86A-83E1744FC1EC}"/>
+              </a:ext>
+            </a:extLst>
+          </p:cNvPr>
+          <p:cNvSpPr txBox="1"/>
+          <p:nvPr/>
+        </p:nvSpPr>
+        <p:spPr>
+          <a:xfrm>
+            <a:off x="8637494" y="1091762"/>
+            <a:ext cx="3061447" cy="1754326"/>
+          </a:xfrm>
+          <a:prstGeom prst="rect">
+            <a:avLst/>
+          </a:prstGeom>
+          <a:noFill/>
+        </p:spPr>
+        <p:txBody>
+          <a:bodyPr wrap="square" rtlCol="0">
+            <a:spAutoFit/>
+          </a:bodyPr>
           <a:lstStyle/>
           <a:p>
+            <a:pPr marL="285750" indent="-285750">
+              <a:buFontTx/>
+              <a:buChar char="-"/>
+            </a:pPr>
             <a:r>
               <a:rPr lang="en-US" dirty="0"/>
-              <a:t>What would be a buyer’s choice for a good “bargain” wine. </a:t>
-            </a:r>
+              <a:t>Top Wines By Variety</a:t>
+            </a:r>
+            <a:br>
+              <a:rPr lang="en-US" dirty="0"/>
+            </a:br>
+            <a:endParaRPr lang="en-US" dirty="0"/>
+          </a:p>
+          <a:p>
+            <a:pPr marL="285750" indent="-285750">
+              <a:buFontTx/>
+              <a:buChar char="-"/>
+            </a:pPr>
+            <a:r>
+              <a:rPr lang="en-US" dirty="0"/>
+              <a:t>There were some ties for top points, so other options are available</a:t>
+            </a:r>
+          </a:p>
+          <a:p>
+            <a:pPr marL="285750" indent="-285750">
+              <a:buFontTx/>
+              <a:buChar char="-"/>
+            </a:pPr>
+            <a:endParaRPr lang="en-US" dirty="0"/>
           </a:p>
         </p:txBody>
       </p:sp>
@@ -45030,43 +45068,19 @@
             <p:ph type="dt" sz="half" idx="10"/>
           </p:nvPr>
         </p:nvSpPr>
-        <p:spPr/>
+        <p:spPr>
+          <a:xfrm>
+            <a:off x="9999518" y="5878720"/>
+            <a:ext cx="1336964" cy="298800"/>
+          </a:xfrm>
+        </p:spPr>
         <p:txBody>
           <a:bodyPr/>
           <a:lstStyle/>
           <a:p>
             <a:r>
               <a:rPr lang="en-US" dirty="0"/>
-              <a:t>MM.DD.20XX</a:t>
-            </a:r>
-            <a:endParaRPr lang="ru-RU" dirty="0"/>
-          </a:p>
-        </p:txBody>
-      </p:sp>
-      <p:sp>
-        <p:nvSpPr>
-          <p:cNvPr id="4" name="Footer Placeholder 3">
-            <a:extLst>
-              <a:ext uri="{FF2B5EF4-FFF2-40B4-BE49-F238E27FC236}">
-                <a16:creationId xmlns:a16="http://schemas.microsoft.com/office/drawing/2014/main" id="{410947E4-5FA8-4748-944C-223DAE7BFC55}"/>
-              </a:ext>
-            </a:extLst>
-          </p:cNvPr>
-          <p:cNvSpPr>
-            <a:spLocks noGrp="1"/>
-          </p:cNvSpPr>
-          <p:nvPr>
-            <p:ph type="ftr" sz="quarter" idx="11"/>
-          </p:nvPr>
-        </p:nvSpPr>
-        <p:spPr/>
-        <p:txBody>
-          <a:bodyPr/>
-          <a:lstStyle/>
-          <a:p>
-            <a:r>
-              <a:rPr lang="en-US" dirty="0"/>
-              <a:t>ADD A FOOTER</a:t>
+              <a:t>11.10.2018</a:t>
             </a:r>
             <a:endParaRPr lang="ru-RU" dirty="0"/>
           </a:p>
@@ -45212,36 +45226,7 @@
           <a:p>
             <a:r>
               <a:rPr lang="en-US" dirty="0"/>
-              <a:t>MM.DD.20XX</a:t>
-            </a:r>
-            <a:endParaRPr lang="ru-RU" dirty="0"/>
-          </a:p>
-        </p:txBody>
-      </p:sp>
-      <p:sp>
-        <p:nvSpPr>
-          <p:cNvPr id="3" name="Footer Placeholder 2">
-            <a:extLst>
-              <a:ext uri="{FF2B5EF4-FFF2-40B4-BE49-F238E27FC236}">
-                <a16:creationId xmlns:a16="http://schemas.microsoft.com/office/drawing/2014/main" id="{38543BA3-BD6A-4419-A160-81C5CCACCDEC}"/>
-              </a:ext>
-            </a:extLst>
-          </p:cNvPr>
-          <p:cNvSpPr>
-            <a:spLocks noGrp="1"/>
-          </p:cNvSpPr>
-          <p:nvPr>
-            <p:ph type="ftr" sz="quarter" idx="11"/>
-          </p:nvPr>
-        </p:nvSpPr>
-        <p:spPr/>
-        <p:txBody>
-          <a:bodyPr/>
-          <a:lstStyle/>
-          <a:p>
-            <a:r>
-              <a:rPr lang="en-US" dirty="0"/>
-              <a:t>ADD A FOOTER</a:t>
+              <a:t>11.10.2018</a:t>
             </a:r>
             <a:endParaRPr lang="ru-RU" dirty="0"/>
           </a:p>
@@ -45557,7 +45542,7 @@
           <a:p>
             <a:r>
               <a:rPr lang="en-US" dirty="0"/>
-              <a:t>MM.DD.20XX</a:t>
+              <a:t>11.10.2018</a:t>
             </a:r>
             <a:endParaRPr lang="ru-RU" dirty="0"/>
           </a:p>
@@ -45931,7 +45916,7 @@
           <a:p>
             <a:r>
               <a:rPr lang="en-US" dirty="0"/>
-              <a:t>MM.DD.20XX</a:t>
+              <a:t>11.10.2018</a:t>
             </a:r>
             <a:endParaRPr lang="ru-RU" dirty="0"/>
           </a:p>
@@ -46244,7 +46229,7 @@
           <a:p>
             <a:r>
               <a:rPr lang="en-US" dirty="0"/>
-              <a:t>MM.DD.20XX</a:t>
+              <a:t>11.10.2018</a:t>
             </a:r>
             <a:endParaRPr lang="ru-RU" dirty="0"/>
           </a:p>

</xml_diff>